<commit_message>
Comitting new version of presentation.
</commit_message>
<xml_diff>
--- a/MADExpo.2011.06/NET Security A-Z/NET Security A-Z.pptx
+++ b/MADExpo.2011.06/NET Security A-Z/NET Security A-Z.pptx
@@ -2,7 +2,7 @@
 <file path=ppt/presentation.xml><?xml version="1.0" encoding="utf-8"?>
 <p:presentation xmlns:a="http://schemas.openxmlformats.org/drawingml/2006/main" xmlns:r="http://schemas.openxmlformats.org/officeDocument/2006/relationships" xmlns:p="http://schemas.openxmlformats.org/presentationml/2006/main" saveSubsetFonts="1">
   <p:sldMasterIdLst>
-    <p:sldMasterId id="2147483675" r:id="rId1"/>
+    <p:sldMasterId id="2147483688" r:id="rId1"/>
   </p:sldMasterIdLst>
   <p:notesMasterIdLst>
     <p:notesMasterId r:id="rId24"/>
@@ -213,7 +213,7 @@
           <a:p>
             <a:fld id="{3F1BE9A0-1B83-48A7-BF6C-2B30829AD224}" type="datetimeFigureOut">
               <a:rPr lang="en-US" smtClean="0"/>
-              <a:t>6/28/11</a:t>
+              <a:t>6/30/11</a:t>
             </a:fld>
             <a:endParaRPr lang="en-US"/>
           </a:p>
@@ -526,18 +526,112 @@
           <a:lstStyle/>
           <a:p>
             <a:r>
+              <a:rPr lang="en-US" dirty="0" smtClean="0"/>
+              <a:t>Misquoted to Bill Gates.</a:t>
+            </a:r>
+            <a:endParaRPr lang="en-US" dirty="0"/>
+          </a:p>
+        </p:txBody>
+      </p:sp>
+      <p:sp>
+        <p:nvSpPr>
+          <p:cNvPr id="4" name="Slide Number Placeholder 3"/>
+          <p:cNvSpPr>
+            <a:spLocks noGrp="1"/>
+          </p:cNvSpPr>
+          <p:nvPr>
+            <p:ph type="sldNum" sz="quarter" idx="10"/>
+          </p:nvPr>
+        </p:nvSpPr>
+        <p:spPr/>
+        <p:txBody>
+          <a:bodyPr/>
+          <a:lstStyle/>
+          <a:p>
+            <a:fld id="{E7A5B200-7646-4440-A7F3-7CDCB68183A8}" type="slidenum">
+              <a:rPr lang="en-US" smtClean="0"/>
+              <a:t>6</a:t>
+            </a:fld>
+            <a:endParaRPr lang="en-US"/>
+          </a:p>
+        </p:txBody>
+      </p:sp>
+    </p:spTree>
+    <p:extLst>
+      <p:ext uri="{BB962C8B-B14F-4D97-AF65-F5344CB8AC3E}">
+        <p14:creationId xmlns:p14="http://schemas.microsoft.com/office/powerpoint/2010/main" val="2957058315"/>
+      </p:ext>
+    </p:extLst>
+  </p:cSld>
+  <p:clrMapOvr>
+    <a:masterClrMapping/>
+  </p:clrMapOvr>
+</p:notes>
+</file>
+
+<file path=ppt/notesSlides/notesSlide2.xml><?xml version="1.0" encoding="utf-8"?>
+<p:notes xmlns:a="http://schemas.openxmlformats.org/drawingml/2006/main" xmlns:r="http://schemas.openxmlformats.org/officeDocument/2006/relationships" xmlns:p="http://schemas.openxmlformats.org/presentationml/2006/main">
+  <p:cSld>
+    <p:spTree>
+      <p:nvGrpSpPr>
+        <p:cNvPr id="1" name=""/>
+        <p:cNvGrpSpPr/>
+        <p:nvPr/>
+      </p:nvGrpSpPr>
+      <p:grpSpPr>
+        <a:xfrm>
+          <a:off x="0" y="0"/>
+          <a:ext cx="0" cy="0"/>
+          <a:chOff x="0" y="0"/>
+          <a:chExt cx="0" cy="0"/>
+        </a:xfrm>
+      </p:grpSpPr>
+      <p:sp>
+        <p:nvSpPr>
+          <p:cNvPr id="2" name="Slide Image Placeholder 1"/>
+          <p:cNvSpPr>
+            <a:spLocks noGrp="1" noRot="1" noChangeAspect="1"/>
+          </p:cNvSpPr>
+          <p:nvPr>
+            <p:ph type="sldImg"/>
+          </p:nvPr>
+        </p:nvSpPr>
+        <p:spPr/>
+      </p:sp>
+      <p:sp>
+        <p:nvSpPr>
+          <p:cNvPr id="3" name="Notes Placeholder 2"/>
+          <p:cNvSpPr>
+            <a:spLocks noGrp="1"/>
+          </p:cNvSpPr>
+          <p:nvPr>
+            <p:ph type="body" idx="1"/>
+          </p:nvPr>
+        </p:nvSpPr>
+        <p:spPr/>
+        <p:txBody>
+          <a:bodyPr/>
+          <a:lstStyle/>
+          <a:p>
+            <a:r>
               <a:rPr lang="en-US" dirty="0" err="1" smtClean="0"/>
               <a:t>HBGary</a:t>
             </a:r>
             <a:r>
               <a:rPr lang="en-US" dirty="0" smtClean="0"/>
-              <a:t> is a good example of </a:t>
-            </a:r>
-            <a:r>
-              <a:rPr lang="en-US" smtClean="0"/>
-              <a:t>Social Engineering</a:t>
-            </a:r>
-            <a:endParaRPr lang="en-US"/>
+              <a:t> is a good example of Social Engineering</a:t>
+            </a:r>
+          </a:p>
+          <a:p>
+            <a:r>
+              <a:rPr lang="en-US" dirty="0" smtClean="0"/>
+              <a:t>Sony –</a:t>
+            </a:r>
+            <a:r>
+              <a:rPr lang="en-US" baseline="0" dirty="0" smtClean="0"/>
+              <a:t> Poor security practices</a:t>
+            </a:r>
+            <a:endParaRPr lang="en-US" dirty="0"/>
           </a:p>
         </p:txBody>
       </p:sp>
@@ -751,14 +845,22 @@
             <p:ph type="dt" sz="half" idx="10"/>
           </p:nvPr>
         </p:nvSpPr>
-        <p:spPr/>
+        <p:spPr>
+          <a:xfrm>
+            <a:off x="457200" y="6324600"/>
+            <a:ext cx="2133600" cy="365125"/>
+          </a:xfrm>
+          <a:prstGeom prst="rect">
+            <a:avLst/>
+          </a:prstGeom>
+        </p:spPr>
         <p:txBody>
           <a:bodyPr/>
           <a:lstStyle/>
           <a:p>
             <a:fld id="{748D98CC-4682-48E7-83AB-9C7343DD49DB}" type="datetimeFigureOut">
               <a:rPr lang="en-US" smtClean="0"/>
-              <a:t>6/28/11</a:t>
+              <a:t>6/30/11</a:t>
             </a:fld>
             <a:endParaRPr lang="en-US"/>
           </a:p>
@@ -916,14 +1018,22 @@
             <p:ph type="dt" sz="half" idx="10"/>
           </p:nvPr>
         </p:nvSpPr>
-        <p:spPr/>
+        <p:spPr>
+          <a:xfrm>
+            <a:off x="457200" y="6324600"/>
+            <a:ext cx="2133600" cy="365125"/>
+          </a:xfrm>
+          <a:prstGeom prst="rect">
+            <a:avLst/>
+          </a:prstGeom>
+        </p:spPr>
         <p:txBody>
           <a:bodyPr/>
           <a:lstStyle/>
           <a:p>
             <a:fld id="{748D98CC-4682-48E7-83AB-9C7343DD49DB}" type="datetimeFigureOut">
               <a:rPr lang="en-US" smtClean="0"/>
-              <a:t>6/28/11</a:t>
+              <a:t>6/30/11</a:t>
             </a:fld>
             <a:endParaRPr lang="en-US"/>
           </a:p>
@@ -1091,14 +1201,22 @@
             <p:ph type="dt" sz="half" idx="10"/>
           </p:nvPr>
         </p:nvSpPr>
-        <p:spPr/>
+        <p:spPr>
+          <a:xfrm>
+            <a:off x="457200" y="6324600"/>
+            <a:ext cx="2133600" cy="365125"/>
+          </a:xfrm>
+          <a:prstGeom prst="rect">
+            <a:avLst/>
+          </a:prstGeom>
+        </p:spPr>
         <p:txBody>
           <a:bodyPr/>
           <a:lstStyle/>
           <a:p>
             <a:fld id="{748D98CC-4682-48E7-83AB-9C7343DD49DB}" type="datetimeFigureOut">
               <a:rPr lang="en-US" smtClean="0"/>
-              <a:t>6/28/11</a:t>
+              <a:t>6/30/11</a:t>
             </a:fld>
             <a:endParaRPr lang="en-US"/>
           </a:p>
@@ -1224,14 +1342,22 @@
             <p:ph type="dt" sz="half" idx="10"/>
           </p:nvPr>
         </p:nvSpPr>
-        <p:spPr/>
+        <p:spPr>
+          <a:xfrm>
+            <a:off x="457200" y="6324600"/>
+            <a:ext cx="2133600" cy="365125"/>
+          </a:xfrm>
+          <a:prstGeom prst="rect">
+            <a:avLst/>
+          </a:prstGeom>
+        </p:spPr>
         <p:txBody>
           <a:bodyPr/>
           <a:lstStyle/>
           <a:p>
             <a:fld id="{748D98CC-4682-48E7-83AB-9C7343DD49DB}" type="datetimeFigureOut">
               <a:rPr lang="en-US" smtClean="0"/>
-              <a:t>6/28/11</a:t>
+              <a:t>6/30/11</a:t>
             </a:fld>
             <a:endParaRPr lang="en-US"/>
           </a:p>
@@ -1449,14 +1575,22 @@
             <p:ph type="dt" sz="half" idx="10"/>
           </p:nvPr>
         </p:nvSpPr>
-        <p:spPr/>
+        <p:spPr>
+          <a:xfrm>
+            <a:off x="457200" y="6324600"/>
+            <a:ext cx="2133600" cy="365125"/>
+          </a:xfrm>
+          <a:prstGeom prst="rect">
+            <a:avLst/>
+          </a:prstGeom>
+        </p:spPr>
         <p:txBody>
           <a:bodyPr/>
           <a:lstStyle/>
           <a:p>
             <a:fld id="{748D98CC-4682-48E7-83AB-9C7343DD49DB}" type="datetimeFigureOut">
               <a:rPr lang="en-US" smtClean="0"/>
-              <a:t>6/28/11</a:t>
+              <a:t>6/30/11</a:t>
             </a:fld>
             <a:endParaRPr lang="en-US"/>
           </a:p>
@@ -1690,14 +1824,22 @@
             <p:ph type="dt" sz="half" idx="10"/>
           </p:nvPr>
         </p:nvSpPr>
-        <p:spPr/>
+        <p:spPr>
+          <a:xfrm>
+            <a:off x="457200" y="6324600"/>
+            <a:ext cx="2133600" cy="365125"/>
+          </a:xfrm>
+          <a:prstGeom prst="rect">
+            <a:avLst/>
+          </a:prstGeom>
+        </p:spPr>
         <p:txBody>
           <a:bodyPr/>
           <a:lstStyle/>
           <a:p>
             <a:fld id="{748D98CC-4682-48E7-83AB-9C7343DD49DB}" type="datetimeFigureOut">
               <a:rPr lang="en-US" smtClean="0"/>
-              <a:t>6/28/11</a:t>
+              <a:t>6/30/11</a:t>
             </a:fld>
             <a:endParaRPr lang="en-US"/>
           </a:p>
@@ -1973,14 +2115,22 @@
             <p:ph type="dt" sz="half" idx="10"/>
           </p:nvPr>
         </p:nvSpPr>
-        <p:spPr/>
+        <p:spPr>
+          <a:xfrm>
+            <a:off x="457200" y="6324600"/>
+            <a:ext cx="2133600" cy="365125"/>
+          </a:xfrm>
+          <a:prstGeom prst="rect">
+            <a:avLst/>
+          </a:prstGeom>
+        </p:spPr>
         <p:txBody>
           <a:bodyPr/>
           <a:lstStyle/>
           <a:p>
             <a:fld id="{748D98CC-4682-48E7-83AB-9C7343DD49DB}" type="datetimeFigureOut">
               <a:rPr lang="en-US" smtClean="0"/>
-              <a:t>6/28/11</a:t>
+              <a:t>6/30/11</a:t>
             </a:fld>
             <a:endParaRPr lang="en-US"/>
           </a:p>
@@ -2390,14 +2540,22 @@
             <p:ph type="dt" sz="half" idx="10"/>
           </p:nvPr>
         </p:nvSpPr>
-        <p:spPr/>
+        <p:spPr>
+          <a:xfrm>
+            <a:off x="457200" y="6324600"/>
+            <a:ext cx="2133600" cy="365125"/>
+          </a:xfrm>
+          <a:prstGeom prst="rect">
+            <a:avLst/>
+          </a:prstGeom>
+        </p:spPr>
         <p:txBody>
           <a:bodyPr/>
           <a:lstStyle/>
           <a:p>
             <a:fld id="{748D98CC-4682-48E7-83AB-9C7343DD49DB}" type="datetimeFigureOut">
               <a:rPr lang="en-US" smtClean="0"/>
-              <a:t>6/28/11</a:t>
+              <a:t>6/30/11</a:t>
             </a:fld>
             <a:endParaRPr lang="en-US"/>
           </a:p>
@@ -2503,14 +2661,22 @@
             <p:ph type="dt" sz="half" idx="10"/>
           </p:nvPr>
         </p:nvSpPr>
-        <p:spPr/>
+        <p:spPr>
+          <a:xfrm>
+            <a:off x="457200" y="6324600"/>
+            <a:ext cx="2133600" cy="365125"/>
+          </a:xfrm>
+          <a:prstGeom prst="rect">
+            <a:avLst/>
+          </a:prstGeom>
+        </p:spPr>
         <p:txBody>
           <a:bodyPr/>
           <a:lstStyle/>
           <a:p>
             <a:fld id="{748D98CC-4682-48E7-83AB-9C7343DD49DB}" type="datetimeFigureOut">
               <a:rPr lang="en-US" smtClean="0"/>
-              <a:t>6/28/11</a:t>
+              <a:t>6/30/11</a:t>
             </a:fld>
             <a:endParaRPr lang="en-US"/>
           </a:p>
@@ -2593,14 +2759,22 @@
             <p:ph type="dt" sz="half" idx="10"/>
           </p:nvPr>
         </p:nvSpPr>
-        <p:spPr/>
+        <p:spPr>
+          <a:xfrm>
+            <a:off x="457200" y="6324600"/>
+            <a:ext cx="2133600" cy="365125"/>
+          </a:xfrm>
+          <a:prstGeom prst="rect">
+            <a:avLst/>
+          </a:prstGeom>
+        </p:spPr>
         <p:txBody>
           <a:bodyPr/>
           <a:lstStyle/>
           <a:p>
             <a:fld id="{748D98CC-4682-48E7-83AB-9C7343DD49DB}" type="datetimeFigureOut">
               <a:rPr lang="en-US" smtClean="0"/>
-              <a:t>6/28/11</a:t>
+              <a:t>6/30/11</a:t>
             </a:fld>
             <a:endParaRPr lang="en-US"/>
           </a:p>
@@ -2865,14 +3039,22 @@
             <p:ph type="dt" sz="half" idx="10"/>
           </p:nvPr>
         </p:nvSpPr>
-        <p:spPr/>
+        <p:spPr>
+          <a:xfrm>
+            <a:off x="457200" y="6324600"/>
+            <a:ext cx="2133600" cy="365125"/>
+          </a:xfrm>
+          <a:prstGeom prst="rect">
+            <a:avLst/>
+          </a:prstGeom>
+        </p:spPr>
         <p:txBody>
           <a:bodyPr/>
           <a:lstStyle/>
           <a:p>
             <a:fld id="{748D98CC-4682-48E7-83AB-9C7343DD49DB}" type="datetimeFigureOut">
               <a:rPr lang="en-US" smtClean="0"/>
-              <a:t>6/28/11</a:t>
+              <a:t>6/30/11</a:t>
             </a:fld>
             <a:endParaRPr lang="en-US"/>
           </a:p>
@@ -3036,7 +3218,7 @@
           <a:p>
             <a:r>
               <a:rPr lang="en-US" smtClean="0"/>
-              <a:t>Click icon to add picture</a:t>
+              <a:t>Drag picture to placeholder or click icon to add</a:t>
             </a:r>
             <a:endParaRPr lang="en-US" dirty="0"/>
           </a:p>
@@ -3117,14 +3299,22 @@
             <p:ph type="dt" sz="half" idx="10"/>
           </p:nvPr>
         </p:nvSpPr>
-        <p:spPr/>
+        <p:spPr>
+          <a:xfrm>
+            <a:off x="457200" y="6324600"/>
+            <a:ext cx="2133600" cy="365125"/>
+          </a:xfrm>
+          <a:prstGeom prst="rect">
+            <a:avLst/>
+          </a:prstGeom>
+        </p:spPr>
         <p:txBody>
           <a:bodyPr/>
           <a:lstStyle/>
           <a:p>
             <a:fld id="{748D98CC-4682-48E7-83AB-9C7343DD49DB}" type="datetimeFigureOut">
               <a:rPr lang="en-US" smtClean="0"/>
-              <a:t>6/28/11</a:t>
+              <a:t>6/30/11</a:t>
             </a:fld>
             <a:endParaRPr lang="en-US"/>
           </a:p>
@@ -3278,7 +3468,9 @@
             <a:avLst/>
           </a:prstGeom>
           <a:blipFill dpi="0" rotWithShape="1">
-            <a:blip r:embed="rId15"/>
+            <a:blip r:embed="rId15">
+              <a:biLevel thresh="75000"/>
+            </a:blip>
             <a:srcRect/>
             <a:stretch>
               <a:fillRect/>
@@ -3418,47 +3610,6 @@
       </p:sp>
       <p:sp>
         <p:nvSpPr>
-          <p:cNvPr id="4" name="Date Placeholder 3"/>
-          <p:cNvSpPr>
-            <a:spLocks noGrp="1"/>
-          </p:cNvSpPr>
-          <p:nvPr>
-            <p:ph type="dt" sz="half" idx="2"/>
-          </p:nvPr>
-        </p:nvSpPr>
-        <p:spPr>
-          <a:xfrm>
-            <a:off x="457200" y="6324600"/>
-            <a:ext cx="2133600" cy="365125"/>
-          </a:xfrm>
-          <a:prstGeom prst="rect">
-            <a:avLst/>
-          </a:prstGeom>
-        </p:spPr>
-        <p:txBody>
-          <a:bodyPr vert="horz" lIns="91440" tIns="45720" rIns="91440" bIns="45720" rtlCol="0" anchor="ctr"/>
-          <a:lstStyle>
-            <a:lvl1pPr algn="l">
-              <a:defRPr sz="1200">
-                <a:solidFill>
-                  <a:schemeClr val="tx1">
-                    <a:tint val="75000"/>
-                  </a:schemeClr>
-                </a:solidFill>
-              </a:defRPr>
-            </a:lvl1pPr>
-          </a:lstStyle>
-          <a:p>
-            <a:fld id="{748D98CC-4682-48E7-83AB-9C7343DD49DB}" type="datetimeFigureOut">
-              <a:rPr lang="en-US" smtClean="0"/>
-              <a:t>6/28/11</a:t>
-            </a:fld>
-            <a:endParaRPr lang="en-US"/>
-          </a:p>
-        </p:txBody>
-      </p:sp>
-      <p:sp>
-        <p:nvSpPr>
           <p:cNvPr id="5" name="Footer Placeholder 4"/>
           <p:cNvSpPr>
             <a:spLocks noGrp="1"/>
@@ -3510,7 +3661,7 @@
         </p:blipFill>
         <p:spPr>
           <a:xfrm>
-            <a:off x="7086600" y="6324600"/>
+            <a:off x="7086600" y="6378808"/>
             <a:ext cx="1536703" cy="368808"/>
           </a:xfrm>
           <a:prstGeom prst="rect">
@@ -3559,22 +3710,51 @@
           </a:p>
         </p:txBody>
       </p:sp>
+      <p:pic>
+        <p:nvPicPr>
+          <p:cNvPr id="11" name="Picture 10"/>
+          <p:cNvPicPr>
+            <a:picLocks noChangeAspect="1"/>
+          </p:cNvPicPr>
+          <p:nvPr/>
+        </p:nvPicPr>
+        <p:blipFill rotWithShape="1">
+          <a:blip r:embed="rId17">
+            <a:extLst>
+              <a:ext uri="{28A0092B-C50C-407E-A947-70E740481C1C}">
+                <a14:useLocalDpi xmlns:a14="http://schemas.microsoft.com/office/drawing/2010/main" val="0"/>
+              </a:ext>
+            </a:extLst>
+          </a:blip>
+          <a:srcRect b="6694"/>
+          <a:stretch/>
+        </p:blipFill>
+        <p:spPr>
+          <a:xfrm>
+            <a:off x="157574" y="6190489"/>
+            <a:ext cx="2146203" cy="667512"/>
+          </a:xfrm>
+          <a:prstGeom prst="rect">
+            <a:avLst/>
+          </a:prstGeom>
+        </p:spPr>
+      </p:pic>
     </p:spTree>
   </p:cSld>
   <p:clrMap bg1="lt1" tx1="dk1" bg2="lt2" tx2="dk2" accent1="accent1" accent2="accent2" accent3="accent3" accent4="accent4" accent5="accent5" accent6="accent6" hlink="hlink" folHlink="folHlink"/>
   <p:sldLayoutIdLst>
-    <p:sldLayoutId id="2147483676" r:id="rId1"/>
-    <p:sldLayoutId id="2147483677" r:id="rId2"/>
-    <p:sldLayoutId id="2147483678" r:id="rId3"/>
-    <p:sldLayoutId id="2147483679" r:id="rId4"/>
-    <p:sldLayoutId id="2147483680" r:id="rId5"/>
-    <p:sldLayoutId id="2147483681" r:id="rId6"/>
-    <p:sldLayoutId id="2147483682" r:id="rId7"/>
-    <p:sldLayoutId id="2147483683" r:id="rId8"/>
-    <p:sldLayoutId id="2147483684" r:id="rId9"/>
-    <p:sldLayoutId id="2147483685" r:id="rId10"/>
-    <p:sldLayoutId id="2147483686" r:id="rId11"/>
-    <p:sldLayoutId id="2147483687" r:id="rId12"/>
+    <p:sldLayoutId id="2147483689" r:id="rId1"/>
+    <p:sldLayoutId id="2147483690" r:id="rId2"/>
+    <p:sldLayoutId id="2147483691" r:id="rId3"/>
+    <p:sldLayoutId id="2147483692" r:id="rId4"/>
+    <p:sldLayoutId id="2147483693" r:id="rId5"/>
+    <p:sldLayoutId id="2147483694" r:id="rId6"/>
+    <p:sldLayoutId id="2147483695" r:id="rId7"/>
+    <p:sldLayoutId id="2147483696" r:id="rId8"/>
+    <p:sldLayoutId id="2147483697" r:id="rId9"/>
+    <p:sldLayoutId id="2147483698" r:id="rId10"/>
+    <p:sldLayoutId id="2147483699" r:id="rId11"/>
+    <p:sldLayoutId id="2147483700" r:id="rId12"/>
   </p:sldLayoutIdLst>
   <p:txStyles>
     <p:titleStyle>
@@ -4173,16 +4353,12 @@
               </a:ext>
             </a:extLst>
           </a:blip>
+          <a:srcRect l="-11853" r="-11853"/>
           <a:stretch>
             <a:fillRect/>
           </a:stretch>
         </p:blipFill>
-        <p:spPr>
-          <a:xfrm>
-            <a:off x="2012000" y="2526067"/>
-            <a:ext cx="5120000" cy="3131429"/>
-          </a:xfrm>
-        </p:spPr>
+        <p:spPr/>
       </p:pic>
     </p:spTree>
     <p:extLst>
@@ -4194,6 +4370,13 @@
   <p:clrMapOvr>
     <a:masterClrMapping/>
   </p:clrMapOvr>
+  <p:timing>
+    <p:tnLst>
+      <p:par>
+        <p:cTn xmlns:p14="http://schemas.microsoft.com/office/powerpoint/2010/main" id="1" dur="indefinite" restart="never" nodeType="tmRoot"/>
+      </p:par>
+    </p:tnLst>
+  </p:timing>
 </p:sld>
 </file>
 
@@ -5100,43 +5283,6 @@
           </a:p>
         </p:txBody>
       </p:sp>
-      <p:pic>
-        <p:nvPicPr>
-          <p:cNvPr id="4" name="Content Placeholder 5" descr="100_1083.jpg"/>
-          <p:cNvPicPr>
-            <a:picLocks noChangeAspect="1"/>
-          </p:cNvPicPr>
-          <p:nvPr/>
-        </p:nvPicPr>
-        <p:blipFill>
-          <a:blip r:embed="rId2" cstate="print"/>
-          <a:stretch>
-            <a:fillRect/>
-          </a:stretch>
-        </p:blipFill>
-        <p:spPr>
-          <a:xfrm>
-            <a:off x="6248400" y="3087292"/>
-            <a:ext cx="2438400" cy="2551508"/>
-          </a:xfrm>
-          <a:prstGeom prst="roundRect">
-            <a:avLst>
-              <a:gd name="adj" fmla="val 8594"/>
-            </a:avLst>
-          </a:prstGeom>
-          <a:solidFill>
-            <a:srgbClr val="FFFFFF">
-              <a:shade val="85000"/>
-            </a:srgbClr>
-          </a:solidFill>
-          <a:ln>
-            <a:noFill/>
-          </a:ln>
-          <a:effectLst>
-            <a:reflection blurRad="12700" stA="38000" endPos="28000" dist="5000" dir="5400000" sy="-100000" algn="bl" rotWithShape="0"/>
-          </a:effectLst>
-        </p:spPr>
-      </p:pic>
     </p:spTree>
     <p:extLst>
       <p:ext uri="{BB962C8B-B14F-4D97-AF65-F5344CB8AC3E}">
@@ -5843,6 +5989,13 @@
   <p:clrMapOvr>
     <a:masterClrMapping/>
   </p:clrMapOvr>
+  <p:timing>
+    <p:tnLst>
+      <p:par>
+        <p:cTn xmlns:p14="http://schemas.microsoft.com/office/powerpoint/2010/main" id="1" dur="indefinite" restart="never" nodeType="tmRoot"/>
+      </p:par>
+    </p:tnLst>
+  </p:timing>
 </p:sld>
 </file>
 
@@ -5937,6 +6090,13 @@
   <p:clrMapOvr>
     <a:masterClrMapping/>
   </p:clrMapOvr>
+  <p:timing>
+    <p:tnLst>
+      <p:par>
+        <p:cTn xmlns:p14="http://schemas.microsoft.com/office/powerpoint/2010/main" id="1" dur="indefinite" restart="never" nodeType="tmRoot"/>
+      </p:par>
+    </p:tnLst>
+  </p:timing>
 </p:sld>
 </file>
 
@@ -6148,7 +6308,7 @@
 </file>
 
 <file path=ppt/theme/theme1.xml><?xml version="1.0" encoding="utf-8"?>
-<a:theme xmlns:a="http://schemas.openxmlformats.org/drawingml/2006/main" name="Thycotic">
+<a:theme xmlns:a="http://schemas.openxmlformats.org/drawingml/2006/main" name="MADExpo">
   <a:themeElements>
     <a:clrScheme name="Office">
       <a:dk1>

</xml_diff>